<commit_message>
first step to fix Path search
</commit_message>
<xml_diff>
--- a/AdventourWorks SQL Agent.pptx
+++ b/AdventourWorks SQL Agent.pptx
@@ -176,18 +176,18 @@
   <pc:docChgLst>
     <pc:chgData name="David Schwarz" userId="9bfc2baea423fe92" providerId="LiveId" clId="{B7971D09-D5E6-45D0-B5FD-0684949C6E2A}"/>
     <pc:docChg chg="undo custSel addSld delSld modSld">
-      <pc:chgData name="David Schwarz" userId="9bfc2baea423fe92" providerId="LiveId" clId="{B7971D09-D5E6-45D0-B5FD-0684949C6E2A}" dt="2025-01-27T14:49:31.951" v="3859" actId="1076"/>
+      <pc:chgData name="David Schwarz" userId="9bfc2baea423fe92" providerId="LiveId" clId="{B7971D09-D5E6-45D0-B5FD-0684949C6E2A}" dt="2025-01-28T08:01:19.766" v="4169" actId="20577"/>
       <pc:docMkLst>
         <pc:docMk/>
       </pc:docMkLst>
       <pc:sldChg chg="modSp mod">
-        <pc:chgData name="David Schwarz" userId="9bfc2baea423fe92" providerId="LiveId" clId="{B7971D09-D5E6-45D0-B5FD-0684949C6E2A}" dt="2025-01-27T14:05:44.739" v="2771" actId="1076"/>
+        <pc:chgData name="David Schwarz" userId="9bfc2baea423fe92" providerId="LiveId" clId="{B7971D09-D5E6-45D0-B5FD-0684949C6E2A}" dt="2025-01-28T07:52:11.030" v="4136" actId="20577"/>
         <pc:sldMkLst>
           <pc:docMk/>
           <pc:sldMk cId="1642425379" sldId="256"/>
         </pc:sldMkLst>
         <pc:spChg chg="mod">
-          <ac:chgData name="David Schwarz" userId="9bfc2baea423fe92" providerId="LiveId" clId="{B7971D09-D5E6-45D0-B5FD-0684949C6E2A}" dt="2025-01-27T14:05:44.739" v="2771" actId="1076"/>
+          <ac:chgData name="David Schwarz" userId="9bfc2baea423fe92" providerId="LiveId" clId="{B7971D09-D5E6-45D0-B5FD-0684949C6E2A}" dt="2025-01-28T07:52:11.030" v="4136" actId="20577"/>
           <ac:spMkLst>
             <pc:docMk/>
             <pc:sldMk cId="1642425379" sldId="256"/>
@@ -288,7 +288,7 @@
         </pc:sldMkLst>
       </pc:sldChg>
       <pc:sldChg chg="modSp new mod">
-        <pc:chgData name="David Schwarz" userId="9bfc2baea423fe92" providerId="LiveId" clId="{B7971D09-D5E6-45D0-B5FD-0684949C6E2A}" dt="2025-01-25T12:09:34.076" v="1160" actId="313"/>
+        <pc:chgData name="David Schwarz" userId="9bfc2baea423fe92" providerId="LiveId" clId="{B7971D09-D5E6-45D0-B5FD-0684949C6E2A}" dt="2025-01-28T07:57:19.178" v="4160" actId="313"/>
         <pc:sldMkLst>
           <pc:docMk/>
           <pc:sldMk cId="1367201527" sldId="293"/>
@@ -302,7 +302,7 @@
           </ac:spMkLst>
         </pc:spChg>
         <pc:spChg chg="mod">
-          <ac:chgData name="David Schwarz" userId="9bfc2baea423fe92" providerId="LiveId" clId="{B7971D09-D5E6-45D0-B5FD-0684949C6E2A}" dt="2025-01-25T12:09:34.076" v="1160" actId="313"/>
+          <ac:chgData name="David Schwarz" userId="9bfc2baea423fe92" providerId="LiveId" clId="{B7971D09-D5E6-45D0-B5FD-0684949C6E2A}" dt="2025-01-28T07:57:19.178" v="4160" actId="313"/>
           <ac:spMkLst>
             <pc:docMk/>
             <pc:sldMk cId="1367201527" sldId="293"/>
@@ -357,7 +357,7 @@
         </pc:spChg>
       </pc:sldChg>
       <pc:sldChg chg="addSp modSp add mod">
-        <pc:chgData name="David Schwarz" userId="9bfc2baea423fe92" providerId="LiveId" clId="{B7971D09-D5E6-45D0-B5FD-0684949C6E2A}" dt="2025-01-25T12:27:20.678" v="1212"/>
+        <pc:chgData name="David Schwarz" userId="9bfc2baea423fe92" providerId="LiveId" clId="{B7971D09-D5E6-45D0-B5FD-0684949C6E2A}" dt="2025-01-28T07:56:39.197" v="4154" actId="20577"/>
         <pc:sldMkLst>
           <pc:docMk/>
           <pc:sldMk cId="1257980490" sldId="296"/>
@@ -371,7 +371,7 @@
           </ac:spMkLst>
         </pc:spChg>
         <pc:spChg chg="mod">
-          <ac:chgData name="David Schwarz" userId="9bfc2baea423fe92" providerId="LiveId" clId="{B7971D09-D5E6-45D0-B5FD-0684949C6E2A}" dt="2025-01-12T17:06:58.142" v="581" actId="20577"/>
+          <ac:chgData name="David Schwarz" userId="9bfc2baea423fe92" providerId="LiveId" clId="{B7971D09-D5E6-45D0-B5FD-0684949C6E2A}" dt="2025-01-28T07:56:39.197" v="4154" actId="20577"/>
           <ac:spMkLst>
             <pc:docMk/>
             <pc:sldMk cId="1257980490" sldId="296"/>
@@ -388,7 +388,7 @@
         </pc:spChg>
       </pc:sldChg>
       <pc:sldChg chg="addSp delSp modSp add mod">
-        <pc:chgData name="David Schwarz" userId="9bfc2baea423fe92" providerId="LiveId" clId="{B7971D09-D5E6-45D0-B5FD-0684949C6E2A}" dt="2025-01-27T14:36:07.304" v="3567" actId="20577"/>
+        <pc:chgData name="David Schwarz" userId="9bfc2baea423fe92" providerId="LiveId" clId="{B7971D09-D5E6-45D0-B5FD-0684949C6E2A}" dt="2025-01-28T08:01:19.766" v="4169" actId="20577"/>
         <pc:sldMkLst>
           <pc:docMk/>
           <pc:sldMk cId="821889409" sldId="297"/>
@@ -402,7 +402,7 @@
           </ac:spMkLst>
         </pc:spChg>
         <pc:spChg chg="mod">
-          <ac:chgData name="David Schwarz" userId="9bfc2baea423fe92" providerId="LiveId" clId="{B7971D09-D5E6-45D0-B5FD-0684949C6E2A}" dt="2025-01-27T14:36:07.304" v="3567" actId="20577"/>
+          <ac:chgData name="David Schwarz" userId="9bfc2baea423fe92" providerId="LiveId" clId="{B7971D09-D5E6-45D0-B5FD-0684949C6E2A}" dt="2025-01-28T08:01:19.766" v="4169" actId="20577"/>
           <ac:spMkLst>
             <pc:docMk/>
             <pc:sldMk cId="821889409" sldId="297"/>
@@ -411,7 +411,7 @@
         </pc:spChg>
       </pc:sldChg>
       <pc:sldChg chg="addSp modSp add mod">
-        <pc:chgData name="David Schwarz" userId="9bfc2baea423fe92" providerId="LiveId" clId="{B7971D09-D5E6-45D0-B5FD-0684949C6E2A}" dt="2025-01-26T12:54:43.396" v="2144" actId="1076"/>
+        <pc:chgData name="David Schwarz" userId="9bfc2baea423fe92" providerId="LiveId" clId="{B7971D09-D5E6-45D0-B5FD-0684949C6E2A}" dt="2025-01-28T07:59:41.758" v="4161" actId="1076"/>
         <pc:sldMkLst>
           <pc:docMk/>
           <pc:sldMk cId="2666532902" sldId="298"/>
@@ -425,7 +425,7 @@
           </ac:spMkLst>
         </pc:spChg>
         <pc:spChg chg="mod">
-          <ac:chgData name="David Schwarz" userId="9bfc2baea423fe92" providerId="LiveId" clId="{B7971D09-D5E6-45D0-B5FD-0684949C6E2A}" dt="2025-01-26T12:54:40.529" v="2143" actId="27636"/>
+          <ac:chgData name="David Schwarz" userId="9bfc2baea423fe92" providerId="LiveId" clId="{B7971D09-D5E6-45D0-B5FD-0684949C6E2A}" dt="2025-01-28T07:59:41.758" v="4161" actId="1076"/>
           <ac:spMkLst>
             <pc:docMk/>
             <pc:sldMk cId="2666532902" sldId="298"/>
@@ -457,7 +457,7 @@
         </pc:sldMkLst>
       </pc:sldChg>
       <pc:sldChg chg="addSp delSp modSp add mod">
-        <pc:chgData name="David Schwarz" userId="9bfc2baea423fe92" providerId="LiveId" clId="{B7971D09-D5E6-45D0-B5FD-0684949C6E2A}" dt="2025-01-25T12:32:26.201" v="1236" actId="1076"/>
+        <pc:chgData name="David Schwarz" userId="9bfc2baea423fe92" providerId="LiveId" clId="{B7971D09-D5E6-45D0-B5FD-0684949C6E2A}" dt="2025-01-28T07:57:02.400" v="4156" actId="14100"/>
         <pc:sldMkLst>
           <pc:docMk/>
           <pc:sldMk cId="2712329391" sldId="299"/>
@@ -471,7 +471,7 @@
           </ac:spMkLst>
         </pc:spChg>
         <pc:spChg chg="mod">
-          <ac:chgData name="David Schwarz" userId="9bfc2baea423fe92" providerId="LiveId" clId="{B7971D09-D5E6-45D0-B5FD-0684949C6E2A}" dt="2025-01-25T12:28:19.974" v="1226" actId="20577"/>
+          <ac:chgData name="David Schwarz" userId="9bfc2baea423fe92" providerId="LiveId" clId="{B7971D09-D5E6-45D0-B5FD-0684949C6E2A}" dt="2025-01-28T07:57:02.400" v="4156" actId="14100"/>
           <ac:spMkLst>
             <pc:docMk/>
             <pc:sldMk cId="2712329391" sldId="299"/>
@@ -488,7 +488,7 @@
         </pc:picChg>
       </pc:sldChg>
       <pc:sldChg chg="modSp add mod">
-        <pc:chgData name="David Schwarz" userId="9bfc2baea423fe92" providerId="LiveId" clId="{B7971D09-D5E6-45D0-B5FD-0684949C6E2A}" dt="2025-01-26T19:38:59.157" v="2147" actId="20577"/>
+        <pc:chgData name="David Schwarz" userId="9bfc2baea423fe92" providerId="LiveId" clId="{B7971D09-D5E6-45D0-B5FD-0684949C6E2A}" dt="2025-01-28T07:42:00.016" v="3993" actId="20577"/>
         <pc:sldMkLst>
           <pc:docMk/>
           <pc:sldMk cId="2930714696" sldId="300"/>
@@ -502,7 +502,7 @@
           </ac:spMkLst>
         </pc:spChg>
         <pc:spChg chg="mod">
-          <ac:chgData name="David Schwarz" userId="9bfc2baea423fe92" providerId="LiveId" clId="{B7971D09-D5E6-45D0-B5FD-0684949C6E2A}" dt="2025-01-26T19:38:59.157" v="2147" actId="20577"/>
+          <ac:chgData name="David Schwarz" userId="9bfc2baea423fe92" providerId="LiveId" clId="{B7971D09-D5E6-45D0-B5FD-0684949C6E2A}" dt="2025-01-28T07:42:00.016" v="3993" actId="20577"/>
           <ac:spMkLst>
             <pc:docMk/>
             <pc:sldMk cId="2930714696" sldId="300"/>
@@ -511,7 +511,7 @@
         </pc:spChg>
       </pc:sldChg>
       <pc:sldChg chg="addSp modSp add mod">
-        <pc:chgData name="David Schwarz" userId="9bfc2baea423fe92" providerId="LiveId" clId="{B7971D09-D5E6-45D0-B5FD-0684949C6E2A}" dt="2025-01-27T14:39:40.427" v="3581" actId="27636"/>
+        <pc:chgData name="David Schwarz" userId="9bfc2baea423fe92" providerId="LiveId" clId="{B7971D09-D5E6-45D0-B5FD-0684949C6E2A}" dt="2025-01-28T07:43:36.529" v="4128" actId="20577"/>
         <pc:sldMkLst>
           <pc:docMk/>
           <pc:sldMk cId="3995703435" sldId="301"/>
@@ -525,7 +525,7 @@
           </ac:spMkLst>
         </pc:spChg>
         <pc:spChg chg="mod">
-          <ac:chgData name="David Schwarz" userId="9bfc2baea423fe92" providerId="LiveId" clId="{B7971D09-D5E6-45D0-B5FD-0684949C6E2A}" dt="2025-01-27T14:39:40.427" v="3581" actId="27636"/>
+          <ac:chgData name="David Schwarz" userId="9bfc2baea423fe92" providerId="LiveId" clId="{B7971D09-D5E6-45D0-B5FD-0684949C6E2A}" dt="2025-01-28T07:43:36.529" v="4128" actId="20577"/>
           <ac:spMkLst>
             <pc:docMk/>
             <pc:sldMk cId="3995703435" sldId="301"/>
@@ -1004,7 +1004,7 @@
           <a:p>
             <a:fld id="{058ABBF3-49A8-4B3F-9773-22E67695BB12}" type="datetimeFigureOut">
               <a:rPr lang="en-US" smtClean="0"/>
-              <a:t>1/27/2025</a:t>
+              <a:t>1/28/2025</a:t>
             </a:fld>
             <a:endParaRPr lang="en-US" dirty="0"/>
           </a:p>
@@ -1181,7 +1181,7 @@
           <a:p>
             <a:fld id="{F44AAC2B-A50D-4386-849A-6B59FB991B4C}" type="datetimeFigureOut">
               <a:rPr lang="en-US" smtClean="0"/>
-              <a:t>1/27/2025</a:t>
+              <a:t>1/28/2025</a:t>
             </a:fld>
             <a:endParaRPr lang="en-US" dirty="0"/>
           </a:p>
@@ -20786,11 +20786,11 @@
           <a:p>
             <a:r>
               <a:rPr lang="en-CH" sz="5000" dirty="0" err="1"/>
-              <a:t>Adventourworks</a:t>
+              <a:t>AdventurWorks</a:t>
             </a:r>
             <a:r>
               <a:rPr lang="en-CH" sz="5000" dirty="0"/>
-              <a:t> SQL Agent</a:t>
+              <a:t>  SQL Agent</a:t>
             </a:r>
             <a:endParaRPr lang="en-US" sz="5000" dirty="0"/>
           </a:p>
@@ -20879,7 +20879,7 @@
         </p:nvSpPr>
         <p:spPr>
           <a:xfrm>
-            <a:off x="4379335" y="1653234"/>
+            <a:off x="3647815" y="1705485"/>
             <a:ext cx="7046040" cy="4518966"/>
           </a:xfrm>
         </p:spPr>
@@ -22381,7 +22381,7 @@
         <p:spPr/>
         <p:txBody>
           <a:bodyPr>
-            <a:normAutofit fontScale="85000" lnSpcReduction="20000"/>
+            <a:normAutofit fontScale="55000" lnSpcReduction="20000"/>
           </a:bodyPr>
           <a:lstStyle/>
           <a:p>
@@ -22474,13 +22474,25 @@
           <a:p>
             <a:r>
               <a:rPr lang="en-CH" dirty="0"/>
-              <a:t>ENV variables </a:t>
+              <a:t>ENV variables to </a:t>
             </a:r>
             <a:r>
               <a:rPr lang="en-CH"/>
-              <a:t>to store API </a:t>
+              <a:t>store secretes </a:t>
             </a:r>
             <a:endParaRPr lang="en-CH" dirty="0"/>
+          </a:p>
+          <a:p>
+            <a:endParaRPr lang="en-CH" dirty="0"/>
+          </a:p>
+          <a:p>
+            <a:pPr marL="0" indent="0">
+              <a:buNone/>
+            </a:pPr>
+            <a:r>
+              <a:rPr lang="en-CH" dirty="0"/>
+              <a:t>-&gt; Setup.txt</a:t>
+            </a:r>
           </a:p>
           <a:p>
             <a:endParaRPr lang="en-CH" dirty="0"/>
@@ -22634,10 +22646,26 @@
             </a:r>
           </a:p>
           <a:p>
-            <a:pPr marL="0" indent="0">
-              <a:buNone/>
-            </a:pPr>
-            <a:endParaRPr lang="en-CH" dirty="0"/>
+            <a:r>
+              <a:rPr lang="en-CH" dirty="0"/>
+              <a:t>Minimal Spanning Tree calculation is not working yet, currently all tables and columns are pas</a:t>
+            </a:r>
+            <a:r>
+              <a:rPr lang="de-CH" dirty="0"/>
+              <a:t>s</a:t>
+            </a:r>
+            <a:r>
+              <a:rPr lang="en-CH" dirty="0"/>
+              <a:t>ed to Prom</a:t>
+            </a:r>
+            <a:r>
+              <a:rPr lang="de-CH" dirty="0"/>
+              <a:t>p</a:t>
+            </a:r>
+            <a:r>
+              <a:rPr lang="en-CH" dirty="0"/>
+              <a:t>t (700+ rows...)</a:t>
+            </a:r>
           </a:p>
           <a:p>
             <a:endParaRPr lang="en-CH" dirty="0"/>
@@ -22763,43 +22791,51 @@
         <p:spPr/>
         <p:txBody>
           <a:bodyPr>
-            <a:normAutofit fontScale="85000" lnSpcReduction="10000"/>
+            <a:normAutofit fontScale="70000" lnSpcReduction="20000"/>
           </a:bodyPr>
           <a:lstStyle/>
           <a:p>
             <a:r>
               <a:rPr lang="en-US" dirty="0"/>
-              <a:t>Utilize indexes in PostgreSQL to enhance search performance.</a:t>
+              <a:t>Optimize prompt length for better resource utilization.</a:t>
             </a:r>
           </a:p>
           <a:p>
             <a:r>
               <a:rPr lang="en-US" dirty="0"/>
-              <a:t>Perform embedding calculations directly within PostgreSQL for greater efficiency compared to Python.</a:t>
+              <a:t>Instead of bulk loading all embeddings into the database, develop an ETL process that supports incremental updates, deletions, and insertions.</a:t>
             </a:r>
           </a:p>
           <a:p>
             <a:r>
               <a:rPr lang="en-US" dirty="0"/>
-              <a:t>Optimize prompt length for better resource utilization.</a:t>
-            </a:r>
+              <a:t>Scale the solution to accommodate larger applications and data models, such as CRM systems, application databases, and data warehouses that are not publicly accessible</a:t>
+            </a:r>
+            <a:endParaRPr lang="en-CH" dirty="0"/>
           </a:p>
           <a:p>
             <a:r>
               <a:rPr lang="en-US" dirty="0"/>
-              <a:t>Instead of bulk loading all embeddings into the database, develop an ETL process that supports incremental updates, deletions, and insertions.</a:t>
+              <a:t>Utilize indexes in PostgreSQL to enhance search performance.</a:t>
             </a:r>
           </a:p>
           <a:p>
             <a:r>
               <a:rPr lang="en-US" dirty="0"/>
-              <a:t>Scale the solution to accommodate larger applications and data models, such as CRM systems, application databases, and data warehouses that are not publicly </a:t>
-            </a:r>
-            <a:r>
-              <a:rPr lang="en-US"/>
-              <a:t>accessible.a</a:t>
-            </a:r>
-            <a:endParaRPr lang="en-CH" dirty="0"/>
+              <a:t>Perform embedding calculations directly within PostgreSQL for greater efficiency compared to Python.</a:t>
+            </a:r>
+          </a:p>
+          <a:p>
+            <a:r>
+              <a:rPr lang="en-CH" dirty="0"/>
+              <a:t>Front-end</a:t>
+            </a:r>
+          </a:p>
+          <a:p>
+            <a:r>
+              <a:rPr lang="en-CH" dirty="0"/>
+              <a:t>SECURITY: Authentication against Front-end &amp; MSSQL DB &amp; Postgres DB -&gt; AD-groups...</a:t>
+            </a:r>
           </a:p>
         </p:txBody>
       </p:sp>
@@ -23101,7 +23137,7 @@
           <a:p>
             <a:r>
               <a:rPr lang="en-CH" dirty="0"/>
-              <a:t>LLMs are quiet good in writing short SQL already</a:t>
+              <a:t>LLMs are quiet good in writing “short” SQL already</a:t>
             </a:r>
           </a:p>
           <a:p>
@@ -23359,7 +23395,11 @@
           <a:p>
             <a:r>
               <a:rPr lang="en-CH" dirty="0"/>
-              <a:t>Create an Agent translating Bu</a:t>
+              <a:t>Create an Agent translating </a:t>
+            </a:r>
+            <a:r>
+              <a:rPr lang="en-CH" dirty="0" err="1"/>
+              <a:t>bu</a:t>
             </a:r>
             <a:r>
               <a:rPr lang="de-CH" dirty="0"/>
@@ -23367,7 +23407,15 @@
             </a:r>
             <a:r>
               <a:rPr lang="en-CH" dirty="0"/>
-              <a:t>s Questions from Analysts into SQL Queries</a:t>
+              <a:t>s questions from analysts into SQL for the </a:t>
+            </a:r>
+            <a:r>
+              <a:rPr lang="de-CH" dirty="0"/>
+              <a:t>AdventureWorks2016</a:t>
+            </a:r>
+            <a:r>
+              <a:rPr lang="en-CH" dirty="0"/>
+              <a:t> DB</a:t>
             </a:r>
           </a:p>
           <a:p>
@@ -23616,8 +23664,8 @@
         </p:nvSpPr>
         <p:spPr>
           <a:xfrm>
-            <a:off x="762000" y="2417763"/>
-            <a:ext cx="4205021" cy="3678235"/>
+            <a:off x="762000" y="2417764"/>
+            <a:ext cx="4205021" cy="1830276"/>
           </a:xfrm>
         </p:spPr>
         <p:txBody>
@@ -25094,6 +25142,15 @@
 </file>
 
 <file path=customXml/item1.xml><?xml version="1.0" encoding="utf-8"?>
+<?mso-contentType ?>
+<FormTemplates xmlns="http://schemas.microsoft.com/sharepoint/v3/contenttype/forms">
+  <Display>DocumentLibraryForm</Display>
+  <Edit>DocumentLibraryForm</Edit>
+  <New>DocumentLibraryForm</New>
+</FormTemplates>
+</file>
+
+<file path=customXml/item2.xml><?xml version="1.0" encoding="utf-8"?>
 <p:properties xmlns:p="http://schemas.microsoft.com/office/2006/metadata/properties" xmlns:xsi="http://www.w3.org/2001/XMLSchema-instance" xmlns:pc="http://schemas.microsoft.com/office/infopath/2007/PartnerControls">
   <documentManagement>
     <Background xmlns="71af3243-3dd4-4a8d-8c0d-dd76da1f02a5">false</Background>
@@ -25111,15 +25168,6 @@
     <MediaServiceKeyPoints xmlns="71af3243-3dd4-4a8d-8c0d-dd76da1f02a5" xsi:nil="true"/>
   </documentManagement>
 </p:properties>
-</file>
-
-<file path=customXml/item2.xml><?xml version="1.0" encoding="utf-8"?>
-<?mso-contentType ?>
-<FormTemplates xmlns="http://schemas.microsoft.com/sharepoint/v3/contenttype/forms">
-  <Display>DocumentLibraryForm</Display>
-  <Edit>DocumentLibraryForm</Edit>
-  <New>DocumentLibraryForm</New>
-</FormTemplates>
 </file>
 
 <file path=customXml/item3.xml><?xml version="1.0" encoding="utf-8"?>
@@ -25435,6 +25483,14 @@
 </file>
 
 <file path=customXml/itemProps1.xml><?xml version="1.0" encoding="utf-8"?>
+<ds:datastoreItem xmlns:ds="http://schemas.openxmlformats.org/officeDocument/2006/customXml" ds:itemID="{8451406B-581B-4C29-A833-E33D8A6AB075}">
+  <ds:schemaRefs>
+    <ds:schemaRef ds:uri="http://schemas.microsoft.com/sharepoint/v3/contenttype/forms"/>
+  </ds:schemaRefs>
+</ds:datastoreItem>
+</file>
+
+<file path=customXml/itemProps2.xml><?xml version="1.0" encoding="utf-8"?>
 <ds:datastoreItem xmlns:ds="http://schemas.openxmlformats.org/officeDocument/2006/customXml" ds:itemID="{0F65614A-92F9-4391-AC3D-F3F5B0704F99}">
   <ds:schemaRefs>
     <ds:schemaRef ds:uri="http://schemas.microsoft.com/office/2006/metadata/properties"/>
@@ -25442,14 +25498,6 @@
     <ds:schemaRef ds:uri="71af3243-3dd4-4a8d-8c0d-dd76da1f02a5"/>
     <ds:schemaRef ds:uri="http://schemas.microsoft.com/sharepoint/v3"/>
     <ds:schemaRef ds:uri="230e9df3-be65-4c73-a93b-d1236ebd677e"/>
-  </ds:schemaRefs>
-</ds:datastoreItem>
-</file>
-
-<file path=customXml/itemProps2.xml><?xml version="1.0" encoding="utf-8"?>
-<ds:datastoreItem xmlns:ds="http://schemas.openxmlformats.org/officeDocument/2006/customXml" ds:itemID="{8451406B-581B-4C29-A833-E33D8A6AB075}">
-  <ds:schemaRefs>
-    <ds:schemaRef ds:uri="http://schemas.microsoft.com/sharepoint/v3/contenttype/forms"/>
   </ds:schemaRefs>
 </ds:datastoreItem>
 </file>

</xml_diff>